<commit_message>
added covid 19 infograph
</commit_message>
<xml_diff>
--- a/papers/04TH/classdescription/presenation.pptx
+++ b/papers/04TH/classdescription/presenation.pptx
@@ -15,13 +15,12 @@
     <p:sldId id="263" r:id="rId9"/>
     <p:sldId id="264" r:id="rId10"/>
     <p:sldId id="265" r:id="rId11"/>
-    <p:sldId id="266" r:id="rId12"/>
-    <p:sldId id="267" r:id="rId13"/>
-    <p:sldId id="268" r:id="rId14"/>
-    <p:sldId id="269" r:id="rId15"/>
-    <p:sldId id="270" r:id="rId16"/>
-    <p:sldId id="271" r:id="rId17"/>
-    <p:sldId id="272" r:id="rId18"/>
+    <p:sldId id="267" r:id="rId12"/>
+    <p:sldId id="268" r:id="rId13"/>
+    <p:sldId id="269" r:id="rId14"/>
+    <p:sldId id="270" r:id="rId15"/>
+    <p:sldId id="271" r:id="rId16"/>
+    <p:sldId id="272" r:id="rId17"/>
   </p:sldIdLst>
   <p:sldSz cx="12192000" cy="6858000"/>
   <p:notesSz cx="6858000" cy="9144000"/>
@@ -120,6 +119,11 @@
       </a:defRPr>
     </a:lvl9pPr>
   </p:defaultTextStyle>
+  <p:extLst>
+    <p:ext uri="{EFAFB233-063F-42B5-8137-9DF3F51BA10A}">
+      <p15:sldGuideLst xmlns:p15="http://schemas.microsoft.com/office/powerpoint/2012/main"/>
+    </p:ext>
+  </p:extLst>
 </p:presentation>
 </file>
 
@@ -309,7 +313,7 @@
           <a:p>
             <a:fld id="{510C2DE5-95A8-4A91-A032-7EE1802F06FC}" type="datetimeFigureOut">
               <a:rPr lang="en-US" smtClean="0"/>
-              <a:t>12/4/2021</a:t>
+              <a:t>12/6/2021</a:t>
             </a:fld>
             <a:endParaRPr lang="en-US"/>
           </a:p>
@@ -584,7 +588,7 @@
           <a:p>
             <a:fld id="{510C2DE5-95A8-4A91-A032-7EE1802F06FC}" type="datetimeFigureOut">
               <a:rPr lang="en-US" smtClean="0"/>
-              <a:t>12/4/2021</a:t>
+              <a:t>12/6/2021</a:t>
             </a:fld>
             <a:endParaRPr lang="en-US"/>
           </a:p>
@@ -778,7 +782,7 @@
           <a:p>
             <a:fld id="{510C2DE5-95A8-4A91-A032-7EE1802F06FC}" type="datetimeFigureOut">
               <a:rPr lang="en-US" smtClean="0"/>
-              <a:t>12/4/2021</a:t>
+              <a:t>12/6/2021</a:t>
             </a:fld>
             <a:endParaRPr lang="en-US"/>
           </a:p>
@@ -1051,7 +1055,7 @@
           <a:p>
             <a:fld id="{510C2DE5-95A8-4A91-A032-7EE1802F06FC}" type="datetimeFigureOut">
               <a:rPr lang="en-US" smtClean="0"/>
-              <a:t>12/4/2021</a:t>
+              <a:t>12/6/2021</a:t>
             </a:fld>
             <a:endParaRPr lang="en-US"/>
           </a:p>
@@ -1392,7 +1396,7 @@
           <a:p>
             <a:fld id="{510C2DE5-95A8-4A91-A032-7EE1802F06FC}" type="datetimeFigureOut">
               <a:rPr lang="en-US" smtClean="0"/>
-              <a:t>12/4/2021</a:t>
+              <a:t>12/6/2021</a:t>
             </a:fld>
             <a:endParaRPr lang="en-US"/>
           </a:p>
@@ -2015,7 +2019,7 @@
           <a:p>
             <a:fld id="{510C2DE5-95A8-4A91-A032-7EE1802F06FC}" type="datetimeFigureOut">
               <a:rPr lang="en-US" smtClean="0"/>
-              <a:t>12/4/2021</a:t>
+              <a:t>12/6/2021</a:t>
             </a:fld>
             <a:endParaRPr lang="en-US"/>
           </a:p>
@@ -2875,7 +2879,7 @@
           <a:p>
             <a:fld id="{510C2DE5-95A8-4A91-A032-7EE1802F06FC}" type="datetimeFigureOut">
               <a:rPr lang="en-US" smtClean="0"/>
-              <a:t>12/4/2021</a:t>
+              <a:t>12/6/2021</a:t>
             </a:fld>
             <a:endParaRPr lang="en-US"/>
           </a:p>
@@ -3045,7 +3049,7 @@
           <a:p>
             <a:fld id="{510C2DE5-95A8-4A91-A032-7EE1802F06FC}" type="datetimeFigureOut">
               <a:rPr lang="en-US" smtClean="0"/>
-              <a:t>12/4/2021</a:t>
+              <a:t>12/6/2021</a:t>
             </a:fld>
             <a:endParaRPr lang="en-US"/>
           </a:p>
@@ -3225,7 +3229,7 @@
           <a:p>
             <a:fld id="{510C2DE5-95A8-4A91-A032-7EE1802F06FC}" type="datetimeFigureOut">
               <a:rPr lang="en-US" smtClean="0"/>
-              <a:t>12/4/2021</a:t>
+              <a:t>12/6/2021</a:t>
             </a:fld>
             <a:endParaRPr lang="en-US"/>
           </a:p>
@@ -3395,7 +3399,7 @@
           <a:p>
             <a:fld id="{510C2DE5-95A8-4A91-A032-7EE1802F06FC}" type="datetimeFigureOut">
               <a:rPr lang="en-US" smtClean="0"/>
-              <a:t>12/4/2021</a:t>
+              <a:t>12/6/2021</a:t>
             </a:fld>
             <a:endParaRPr lang="en-US"/>
           </a:p>
@@ -3642,7 +3646,7 @@
           <a:p>
             <a:fld id="{510C2DE5-95A8-4A91-A032-7EE1802F06FC}" type="datetimeFigureOut">
               <a:rPr lang="en-US" smtClean="0"/>
-              <a:t>12/4/2021</a:t>
+              <a:t>12/6/2021</a:t>
             </a:fld>
             <a:endParaRPr lang="en-US"/>
           </a:p>
@@ -3934,7 +3938,7 @@
           <a:p>
             <a:fld id="{510C2DE5-95A8-4A91-A032-7EE1802F06FC}" type="datetimeFigureOut">
               <a:rPr lang="en-US" smtClean="0"/>
-              <a:t>12/4/2021</a:t>
+              <a:t>12/6/2021</a:t>
             </a:fld>
             <a:endParaRPr lang="en-US"/>
           </a:p>
@@ -4378,7 +4382,7 @@
           <a:p>
             <a:fld id="{510C2DE5-95A8-4A91-A032-7EE1802F06FC}" type="datetimeFigureOut">
               <a:rPr lang="en-US" smtClean="0"/>
-              <a:t>12/4/2021</a:t>
+              <a:t>12/6/2021</a:t>
             </a:fld>
             <a:endParaRPr lang="en-US"/>
           </a:p>
@@ -4496,7 +4500,7 @@
           <a:p>
             <a:fld id="{510C2DE5-95A8-4A91-A032-7EE1802F06FC}" type="datetimeFigureOut">
               <a:rPr lang="en-US" smtClean="0"/>
-              <a:t>12/4/2021</a:t>
+              <a:t>12/6/2021</a:t>
             </a:fld>
             <a:endParaRPr lang="en-US"/>
           </a:p>
@@ -4591,7 +4595,7 @@
           <a:p>
             <a:fld id="{510C2DE5-95A8-4A91-A032-7EE1802F06FC}" type="datetimeFigureOut">
               <a:rPr lang="en-US" smtClean="0"/>
-              <a:t>12/4/2021</a:t>
+              <a:t>12/6/2021</a:t>
             </a:fld>
             <a:endParaRPr lang="en-US"/>
           </a:p>
@@ -4870,7 +4874,7 @@
           <a:p>
             <a:fld id="{510C2DE5-95A8-4A91-A032-7EE1802F06FC}" type="datetimeFigureOut">
               <a:rPr lang="en-US" smtClean="0"/>
-              <a:t>12/4/2021</a:t>
+              <a:t>12/6/2021</a:t>
             </a:fld>
             <a:endParaRPr lang="en-US"/>
           </a:p>
@@ -5145,7 +5149,7 @@
           <a:p>
             <a:fld id="{510C2DE5-95A8-4A91-A032-7EE1802F06FC}" type="datetimeFigureOut">
               <a:rPr lang="en-US" smtClean="0"/>
-              <a:t>12/4/2021</a:t>
+              <a:t>12/6/2021</a:t>
             </a:fld>
             <a:endParaRPr lang="en-US"/>
           </a:p>
@@ -5574,7 +5578,7 @@
           <a:p>
             <a:fld id="{510C2DE5-95A8-4A91-A032-7EE1802F06FC}" type="datetimeFigureOut">
               <a:rPr lang="en-US" smtClean="0"/>
-              <a:t>12/4/2021</a:t>
+              <a:t>12/6/2021</a:t>
             </a:fld>
             <a:endParaRPr lang="en-US"/>
           </a:p>
@@ -6305,6 +6309,43 @@
       </p:grpSpPr>
       <p:sp>
         <p:nvSpPr>
+          <p:cNvPr id="2" name="Title 1"/>
+          <p:cNvSpPr>
+            <a:spLocks noGrp="1"/>
+          </p:cNvSpPr>
+          <p:nvPr>
+            <p:ph type="ctrTitle"/>
+          </p:nvPr>
+        </p:nvSpPr>
+        <p:spPr>
+          <a:xfrm>
+            <a:off x="1524000" y="386367"/>
+            <a:ext cx="9144000" cy="1764405"/>
+          </a:xfrm>
+        </p:spPr>
+        <p:txBody>
+          <a:bodyPr>
+            <a:normAutofit fontScale="90000"/>
+          </a:bodyPr>
+          <a:lstStyle/>
+          <a:p>
+            <a:r>
+              <a:rPr lang="en-GB" sz="4000" b="1" dirty="0"/>
+              <a:t>Problem four: statistical distribution of each student grade:</a:t>
+            </a:r>
+            <a:r>
+              <a:rPr lang="en-US" sz="4000" dirty="0"/>
+              <a:t/>
+            </a:r>
+            <a:br>
+              <a:rPr lang="en-US" sz="4000" dirty="0"/>
+            </a:br>
+            <a:endParaRPr lang="en-US" sz="4000" dirty="0"/>
+          </a:p>
+        </p:txBody>
+      </p:sp>
+      <p:sp>
+        <p:nvSpPr>
           <p:cNvPr id="3" name="Subtitle 2"/>
           <p:cNvSpPr>
             <a:spLocks noGrp="1"/>
@@ -6313,45 +6354,28 @@
             <p:ph type="subTitle" idx="1"/>
           </p:nvPr>
         </p:nvSpPr>
-        <p:spPr/>
+        <p:spPr>
+          <a:xfrm>
+            <a:off x="1524000" y="1867437"/>
+            <a:ext cx="9144000" cy="3876540"/>
+          </a:xfrm>
+        </p:spPr>
         <p:txBody>
           <a:bodyPr/>
           <a:lstStyle/>
           <a:p>
             <a:r>
-              <a:rPr lang="en-GB" dirty="0" smtClean="0"/>
-              <a:t>  </a:t>
+              <a:rPr lang="en-GB" dirty="0"/>
+              <a:t>To achieve this , a new  column called student grade bands so established and then a new function that reads from the next tables containing the grade band is inserted and then read across using the excel VLOOKUP function to read this data into the newly created column list for grade bands; </a:t>
             </a:r>
             <a:endParaRPr lang="en-US" dirty="0"/>
           </a:p>
         </p:txBody>
       </p:sp>
-      <p:pic>
-        <p:nvPicPr>
-          <p:cNvPr id="5" name="Picture 4"/>
-          <p:cNvPicPr/>
-          <p:nvPr/>
-        </p:nvPicPr>
-        <p:blipFill>
-          <a:blip r:embed="rId2"/>
-          <a:stretch>
-            <a:fillRect/>
-          </a:stretch>
-        </p:blipFill>
-        <p:spPr>
-          <a:xfrm>
-            <a:off x="1249251" y="643945"/>
-            <a:ext cx="8783391" cy="3882018"/>
-          </a:xfrm>
-          <a:prstGeom prst="rect">
-            <a:avLst/>
-          </a:prstGeom>
-        </p:spPr>
-      </p:pic>
     </p:spTree>
     <p:extLst>
       <p:ext uri="{BB962C8B-B14F-4D97-AF65-F5344CB8AC3E}">
-        <p14:creationId xmlns:p14="http://schemas.microsoft.com/office/powerpoint/2010/main" val="544180525"/>
+        <p14:creationId xmlns:p14="http://schemas.microsoft.com/office/powerpoint/2010/main" val="4217321483"/>
       </p:ext>
     </p:extLst>
   </p:cSld>
@@ -6378,75 +6402,32 @@
           <a:chExt cx="0" cy="0"/>
         </a:xfrm>
       </p:grpSpPr>
-      <p:sp>
-        <p:nvSpPr>
-          <p:cNvPr id="2" name="Title 1"/>
-          <p:cNvSpPr>
-            <a:spLocks noGrp="1"/>
-          </p:cNvSpPr>
-          <p:nvPr>
-            <p:ph type="ctrTitle"/>
-          </p:nvPr>
-        </p:nvSpPr>
-        <p:spPr>
-          <a:xfrm>
-            <a:off x="1524000" y="386367"/>
-            <a:ext cx="9144000" cy="1764405"/>
-          </a:xfrm>
-        </p:spPr>
-        <p:txBody>
-          <a:bodyPr>
-            <a:normAutofit fontScale="90000"/>
-          </a:bodyPr>
-          <a:lstStyle/>
-          <a:p>
-            <a:r>
-              <a:rPr lang="en-GB" sz="4000" b="1" dirty="0"/>
-              <a:t>Problem four: statistical distribution of each student grade:</a:t>
-            </a:r>
-            <a:r>
-              <a:rPr lang="en-US" sz="4000" dirty="0"/>
-              <a:t/>
-            </a:r>
-            <a:br>
-              <a:rPr lang="en-US" sz="4000" dirty="0"/>
-            </a:br>
-            <a:endParaRPr lang="en-US" sz="4000" dirty="0"/>
-          </a:p>
-        </p:txBody>
-      </p:sp>
-      <p:sp>
-        <p:nvSpPr>
-          <p:cNvPr id="3" name="Subtitle 2"/>
-          <p:cNvSpPr>
-            <a:spLocks noGrp="1"/>
-          </p:cNvSpPr>
-          <p:nvPr>
-            <p:ph type="subTitle" idx="1"/>
-          </p:nvPr>
-        </p:nvSpPr>
-        <p:spPr>
-          <a:xfrm>
-            <a:off x="1524000" y="1867437"/>
-            <a:ext cx="9144000" cy="3876540"/>
-          </a:xfrm>
-        </p:spPr>
-        <p:txBody>
-          <a:bodyPr/>
-          <a:lstStyle/>
-          <a:p>
-            <a:r>
-              <a:rPr lang="en-GB" dirty="0"/>
-              <a:t>To achieve this , a new  column called student grade bands so established and then a new function that reads from the next tables containing the grade band is inserted and then read across using the excel VLOOKUP function to read this data into the newly created column list for grade bands; </a:t>
-            </a:r>
-            <a:endParaRPr lang="en-US" dirty="0"/>
-          </a:p>
-        </p:txBody>
-      </p:sp>
+      <p:pic>
+        <p:nvPicPr>
+          <p:cNvPr id="3" name="Picture 2"/>
+          <p:cNvPicPr/>
+          <p:nvPr/>
+        </p:nvPicPr>
+        <p:blipFill>
+          <a:blip r:embed="rId2"/>
+          <a:stretch>
+            <a:fillRect/>
+          </a:stretch>
+        </p:blipFill>
+        <p:spPr>
+          <a:xfrm>
+            <a:off x="1352282" y="1043189"/>
+            <a:ext cx="8500056" cy="3580326"/>
+          </a:xfrm>
+          <a:prstGeom prst="rect">
+            <a:avLst/>
+          </a:prstGeom>
+        </p:spPr>
+      </p:pic>
     </p:spTree>
     <p:extLst>
       <p:ext uri="{BB962C8B-B14F-4D97-AF65-F5344CB8AC3E}">
-        <p14:creationId xmlns:p14="http://schemas.microsoft.com/office/powerpoint/2010/main" val="4217321483"/>
+        <p14:creationId xmlns:p14="http://schemas.microsoft.com/office/powerpoint/2010/main" val="2812621781"/>
       </p:ext>
     </p:extLst>
   </p:cSld>
@@ -6457,6 +6438,165 @@
 </file>
 
 <file path=ppt/slides/slide13.xml><?xml version="1.0" encoding="utf-8"?>
+<p:sld xmlns:a="http://schemas.openxmlformats.org/drawingml/2006/main" xmlns:r="http://schemas.openxmlformats.org/officeDocument/2006/relationships" xmlns:p="http://schemas.openxmlformats.org/presentationml/2006/main">
+  <p:cSld>
+    <p:spTree>
+      <p:nvGrpSpPr>
+        <p:cNvPr id="1" name=""/>
+        <p:cNvGrpSpPr/>
+        <p:nvPr/>
+      </p:nvGrpSpPr>
+      <p:grpSpPr>
+        <a:xfrm>
+          <a:off x="0" y="0"/>
+          <a:ext cx="0" cy="0"/>
+          <a:chOff x="0" y="0"/>
+          <a:chExt cx="0" cy="0"/>
+        </a:xfrm>
+      </p:grpSpPr>
+      <p:sp>
+        <p:nvSpPr>
+          <p:cNvPr id="2" name="Title 1"/>
+          <p:cNvSpPr>
+            <a:spLocks noGrp="1"/>
+          </p:cNvSpPr>
+          <p:nvPr>
+            <p:ph type="ctrTitle"/>
+          </p:nvPr>
+        </p:nvSpPr>
+        <p:spPr>
+          <a:xfrm>
+            <a:off x="1524000" y="592428"/>
+            <a:ext cx="9144000" cy="2202287"/>
+          </a:xfrm>
+        </p:spPr>
+        <p:txBody>
+          <a:bodyPr>
+            <a:normAutofit fontScale="90000"/>
+          </a:bodyPr>
+          <a:lstStyle/>
+          <a:p>
+            <a:r>
+              <a:rPr lang="en-GB" b="1" dirty="0"/>
+              <a:t>Data presentations </a:t>
+            </a:r>
+            <a:r>
+              <a:rPr lang="en-US" dirty="0"/>
+              <a:t/>
+            </a:r>
+            <a:br>
+              <a:rPr lang="en-US" dirty="0"/>
+            </a:br>
+            <a:endParaRPr lang="en-US" dirty="0"/>
+          </a:p>
+        </p:txBody>
+      </p:sp>
+      <p:sp>
+        <p:nvSpPr>
+          <p:cNvPr id="3" name="Subtitle 2"/>
+          <p:cNvSpPr>
+            <a:spLocks noGrp="1"/>
+          </p:cNvSpPr>
+          <p:nvPr>
+            <p:ph type="subTitle" idx="1"/>
+          </p:nvPr>
+        </p:nvSpPr>
+        <p:spPr>
+          <a:xfrm>
+            <a:off x="1524000" y="2189408"/>
+            <a:ext cx="9144000" cy="3029755"/>
+          </a:xfrm>
+        </p:spPr>
+        <p:txBody>
+          <a:bodyPr/>
+          <a:lstStyle/>
+          <a:p>
+            <a:r>
+              <a:rPr lang="en-GB" dirty="0"/>
+              <a:t>A summary presentation of this data was also visualised to reveal some of the quickest trends. For instance, the analysis of the top student’s ordered against their weighted marks revealed the following data. It can be observed that Albert and Eva were leading at the front while Janis and Peter came at the last.</a:t>
+            </a:r>
+            <a:endParaRPr lang="en-US" dirty="0"/>
+          </a:p>
+          <a:p>
+            <a:endParaRPr lang="en-US" dirty="0"/>
+          </a:p>
+        </p:txBody>
+      </p:sp>
+    </p:spTree>
+    <p:extLst>
+      <p:ext uri="{BB962C8B-B14F-4D97-AF65-F5344CB8AC3E}">
+        <p14:creationId xmlns:p14="http://schemas.microsoft.com/office/powerpoint/2010/main" val="4211971093"/>
+      </p:ext>
+    </p:extLst>
+  </p:cSld>
+  <p:clrMapOvr>
+    <a:masterClrMapping/>
+  </p:clrMapOvr>
+</p:sld>
+</file>
+
+<file path=ppt/slides/slide14.xml><?xml version="1.0" encoding="utf-8"?>
+<p:sld xmlns:a="http://schemas.openxmlformats.org/drawingml/2006/main" xmlns:r="http://schemas.openxmlformats.org/officeDocument/2006/relationships" xmlns:p="http://schemas.openxmlformats.org/presentationml/2006/main">
+  <p:cSld>
+    <p:spTree>
+      <p:nvGrpSpPr>
+        <p:cNvPr id="1" name=""/>
+        <p:cNvGrpSpPr/>
+        <p:nvPr/>
+      </p:nvGrpSpPr>
+      <p:grpSpPr>
+        <a:xfrm>
+          <a:off x="0" y="0"/>
+          <a:ext cx="0" cy="0"/>
+          <a:chOff x="0" y="0"/>
+          <a:chExt cx="0" cy="0"/>
+        </a:xfrm>
+      </p:grpSpPr>
+      <p:sp>
+        <p:nvSpPr>
+          <p:cNvPr id="3" name="Subtitle 2"/>
+          <p:cNvSpPr>
+            <a:spLocks noGrp="1"/>
+          </p:cNvSpPr>
+          <p:nvPr>
+            <p:ph type="subTitle" idx="1"/>
+          </p:nvPr>
+        </p:nvSpPr>
+        <p:spPr>
+          <a:xfrm>
+            <a:off x="888642" y="450761"/>
+            <a:ext cx="9779358" cy="5048518"/>
+          </a:xfrm>
+        </p:spPr>
+        <p:txBody>
+          <a:bodyPr/>
+          <a:lstStyle/>
+          <a:p>
+            <a:r>
+              <a:rPr lang="en-GB" dirty="0"/>
+              <a:t>Further, analysis of the groupings by grades revealed the grade B had the highest number of students while grade B+ only had 1 student. In terms of marks and rankings of all students, again it can be observed that Albert, Eva and John scored the highest marks</a:t>
+            </a:r>
+            <a:endParaRPr lang="en-US" dirty="0"/>
+          </a:p>
+          <a:p>
+            <a:endParaRPr lang="en-US" dirty="0"/>
+          </a:p>
+        </p:txBody>
+      </p:sp>
+    </p:spTree>
+    <p:extLst>
+      <p:ext uri="{BB962C8B-B14F-4D97-AF65-F5344CB8AC3E}">
+        <p14:creationId xmlns:p14="http://schemas.microsoft.com/office/powerpoint/2010/main" val="3053987447"/>
+      </p:ext>
+    </p:extLst>
+  </p:cSld>
+  <p:clrMapOvr>
+    <a:masterClrMapping/>
+  </p:clrMapOvr>
+</p:sld>
+</file>
+
+<file path=ppt/slides/slide15.xml><?xml version="1.0" encoding="utf-8"?>
 <p:sld xmlns:a="http://schemas.openxmlformats.org/drawingml/2006/main" xmlns:r="http://schemas.openxmlformats.org/officeDocument/2006/relationships" xmlns:p="http://schemas.openxmlformats.org/presentationml/2006/main">
   <p:cSld>
     <p:spTree>
@@ -6487,8 +6627,8 @@
         </p:blipFill>
         <p:spPr>
           <a:xfrm>
-            <a:off x="1081825" y="824248"/>
-            <a:ext cx="8796271" cy="3940935"/>
+            <a:off x="2459864" y="1120463"/>
+            <a:ext cx="6143222" cy="3789340"/>
           </a:xfrm>
           <a:prstGeom prst="rect">
             <a:avLst/>
@@ -6498,166 +6638,7 @@
     </p:spTree>
     <p:extLst>
       <p:ext uri="{BB962C8B-B14F-4D97-AF65-F5344CB8AC3E}">
-        <p14:creationId xmlns:p14="http://schemas.microsoft.com/office/powerpoint/2010/main" val="2812621781"/>
-      </p:ext>
-    </p:extLst>
-  </p:cSld>
-  <p:clrMapOvr>
-    <a:masterClrMapping/>
-  </p:clrMapOvr>
-</p:sld>
-</file>
-
-<file path=ppt/slides/slide14.xml><?xml version="1.0" encoding="utf-8"?>
-<p:sld xmlns:a="http://schemas.openxmlformats.org/drawingml/2006/main" xmlns:r="http://schemas.openxmlformats.org/officeDocument/2006/relationships" xmlns:p="http://schemas.openxmlformats.org/presentationml/2006/main">
-  <p:cSld>
-    <p:spTree>
-      <p:nvGrpSpPr>
-        <p:cNvPr id="1" name=""/>
-        <p:cNvGrpSpPr/>
-        <p:nvPr/>
-      </p:nvGrpSpPr>
-      <p:grpSpPr>
-        <a:xfrm>
-          <a:off x="0" y="0"/>
-          <a:ext cx="0" cy="0"/>
-          <a:chOff x="0" y="0"/>
-          <a:chExt cx="0" cy="0"/>
-        </a:xfrm>
-      </p:grpSpPr>
-      <p:sp>
-        <p:nvSpPr>
-          <p:cNvPr id="2" name="Title 1"/>
-          <p:cNvSpPr>
-            <a:spLocks noGrp="1"/>
-          </p:cNvSpPr>
-          <p:nvPr>
-            <p:ph type="ctrTitle"/>
-          </p:nvPr>
-        </p:nvSpPr>
-        <p:spPr>
-          <a:xfrm>
-            <a:off x="1524000" y="592428"/>
-            <a:ext cx="9144000" cy="2202287"/>
-          </a:xfrm>
-        </p:spPr>
-        <p:txBody>
-          <a:bodyPr>
-            <a:normAutofit fontScale="90000"/>
-          </a:bodyPr>
-          <a:lstStyle/>
-          <a:p>
-            <a:r>
-              <a:rPr lang="en-GB" b="1" dirty="0"/>
-              <a:t>Data presentations </a:t>
-            </a:r>
-            <a:r>
-              <a:rPr lang="en-US" dirty="0"/>
-              <a:t/>
-            </a:r>
-            <a:br>
-              <a:rPr lang="en-US" dirty="0"/>
-            </a:br>
-            <a:endParaRPr lang="en-US" dirty="0"/>
-          </a:p>
-        </p:txBody>
-      </p:sp>
-      <p:sp>
-        <p:nvSpPr>
-          <p:cNvPr id="3" name="Subtitle 2"/>
-          <p:cNvSpPr>
-            <a:spLocks noGrp="1"/>
-          </p:cNvSpPr>
-          <p:nvPr>
-            <p:ph type="subTitle" idx="1"/>
-          </p:nvPr>
-        </p:nvSpPr>
-        <p:spPr>
-          <a:xfrm>
-            <a:off x="1524000" y="2189408"/>
-            <a:ext cx="9144000" cy="3029755"/>
-          </a:xfrm>
-        </p:spPr>
-        <p:txBody>
-          <a:bodyPr/>
-          <a:lstStyle/>
-          <a:p>
-            <a:r>
-              <a:rPr lang="en-GB" dirty="0"/>
-              <a:t>A summary presentation of this data was also visualised to reveal some of the quickest trends. For instance, the analysis of the top student’s ordered against their weighted marks revealed the following data. It can be observed that Albert and Eva were leading at the front while Janis and Peter came at the last.</a:t>
-            </a:r>
-            <a:endParaRPr lang="en-US" dirty="0"/>
-          </a:p>
-          <a:p>
-            <a:endParaRPr lang="en-US" dirty="0"/>
-          </a:p>
-        </p:txBody>
-      </p:sp>
-    </p:spTree>
-    <p:extLst>
-      <p:ext uri="{BB962C8B-B14F-4D97-AF65-F5344CB8AC3E}">
-        <p14:creationId xmlns:p14="http://schemas.microsoft.com/office/powerpoint/2010/main" val="4211971093"/>
-      </p:ext>
-    </p:extLst>
-  </p:cSld>
-  <p:clrMapOvr>
-    <a:masterClrMapping/>
-  </p:clrMapOvr>
-</p:sld>
-</file>
-
-<file path=ppt/slides/slide15.xml><?xml version="1.0" encoding="utf-8"?>
-<p:sld xmlns:a="http://schemas.openxmlformats.org/drawingml/2006/main" xmlns:r="http://schemas.openxmlformats.org/officeDocument/2006/relationships" xmlns:p="http://schemas.openxmlformats.org/presentationml/2006/main">
-  <p:cSld>
-    <p:spTree>
-      <p:nvGrpSpPr>
-        <p:cNvPr id="1" name=""/>
-        <p:cNvGrpSpPr/>
-        <p:nvPr/>
-      </p:nvGrpSpPr>
-      <p:grpSpPr>
-        <a:xfrm>
-          <a:off x="0" y="0"/>
-          <a:ext cx="0" cy="0"/>
-          <a:chOff x="0" y="0"/>
-          <a:chExt cx="0" cy="0"/>
-        </a:xfrm>
-      </p:grpSpPr>
-      <p:sp>
-        <p:nvSpPr>
-          <p:cNvPr id="3" name="Subtitle 2"/>
-          <p:cNvSpPr>
-            <a:spLocks noGrp="1"/>
-          </p:cNvSpPr>
-          <p:nvPr>
-            <p:ph type="subTitle" idx="1"/>
-          </p:nvPr>
-        </p:nvSpPr>
-        <p:spPr>
-          <a:xfrm>
-            <a:off x="888642" y="450761"/>
-            <a:ext cx="9779358" cy="5048518"/>
-          </a:xfrm>
-        </p:spPr>
-        <p:txBody>
-          <a:bodyPr/>
-          <a:lstStyle/>
-          <a:p>
-            <a:r>
-              <a:rPr lang="en-GB" dirty="0"/>
-              <a:t>Further, analysis of the groupings by grades revealed the grade B had the highest number of students while grade B+ only had 1 student. In terms of marks and rankings of all students, again it can be observed that Albert, Eva and John scored the highest marks</a:t>
-            </a:r>
-            <a:endParaRPr lang="en-US" dirty="0"/>
-          </a:p>
-          <a:p>
-            <a:endParaRPr lang="en-US" dirty="0"/>
-          </a:p>
-        </p:txBody>
-      </p:sp>
-    </p:spTree>
-    <p:extLst>
-      <p:ext uri="{BB962C8B-B14F-4D97-AF65-F5344CB8AC3E}">
-        <p14:creationId xmlns:p14="http://schemas.microsoft.com/office/powerpoint/2010/main" val="3053987447"/>
+        <p14:creationId xmlns:p14="http://schemas.microsoft.com/office/powerpoint/2010/main" val="601832444"/>
       </p:ext>
     </p:extLst>
   </p:cSld>
@@ -6686,7 +6667,7 @@
       </p:grpSpPr>
       <p:pic>
         <p:nvPicPr>
-          <p:cNvPr id="4" name="Picture 3"/>
+          <p:cNvPr id="3" name="Picture 2"/>
           <p:cNvPicPr/>
           <p:nvPr/>
         </p:nvPicPr>
@@ -6698,60 +6679,8 @@
         </p:blipFill>
         <p:spPr>
           <a:xfrm>
-            <a:off x="2459864" y="1120463"/>
-            <a:ext cx="6143222" cy="3789340"/>
-          </a:xfrm>
-          <a:prstGeom prst="rect">
-            <a:avLst/>
-          </a:prstGeom>
-        </p:spPr>
-      </p:pic>
-    </p:spTree>
-    <p:extLst>
-      <p:ext uri="{BB962C8B-B14F-4D97-AF65-F5344CB8AC3E}">
-        <p14:creationId xmlns:p14="http://schemas.microsoft.com/office/powerpoint/2010/main" val="601832444"/>
-      </p:ext>
-    </p:extLst>
-  </p:cSld>
-  <p:clrMapOvr>
-    <a:masterClrMapping/>
-  </p:clrMapOvr>
-</p:sld>
-</file>
-
-<file path=ppt/slides/slide17.xml><?xml version="1.0" encoding="utf-8"?>
-<p:sld xmlns:a="http://schemas.openxmlformats.org/drawingml/2006/main" xmlns:r="http://schemas.openxmlformats.org/officeDocument/2006/relationships" xmlns:p="http://schemas.openxmlformats.org/presentationml/2006/main">
-  <p:cSld>
-    <p:spTree>
-      <p:nvGrpSpPr>
-        <p:cNvPr id="1" name=""/>
-        <p:cNvGrpSpPr/>
-        <p:nvPr/>
-      </p:nvGrpSpPr>
-      <p:grpSpPr>
-        <a:xfrm>
-          <a:off x="0" y="0"/>
-          <a:ext cx="0" cy="0"/>
-          <a:chOff x="0" y="0"/>
-          <a:chExt cx="0" cy="0"/>
-        </a:xfrm>
-      </p:grpSpPr>
-      <p:pic>
-        <p:nvPicPr>
-          <p:cNvPr id="4" name="Picture 3"/>
-          <p:cNvPicPr/>
-          <p:nvPr/>
-        </p:nvPicPr>
-        <p:blipFill>
-          <a:blip r:embed="rId2"/>
-          <a:stretch>
-            <a:fillRect/>
-          </a:stretch>
-        </p:blipFill>
-        <p:spPr>
-          <a:xfrm>
-            <a:off x="1635617" y="1017431"/>
-            <a:ext cx="8036417" cy="3966693"/>
+            <a:off x="1700011" y="798491"/>
+            <a:ext cx="7534141" cy="4430332"/>
           </a:xfrm>
           <a:prstGeom prst="rect">
             <a:avLst/>
@@ -7503,7 +7432,7 @@
       </p:grpSpPr>
       <p:pic>
         <p:nvPicPr>
-          <p:cNvPr id="4" name="Picture 3"/>
+          <p:cNvPr id="3" name="Picture 2"/>
           <p:cNvPicPr/>
           <p:nvPr/>
         </p:nvPicPr>
@@ -7515,8 +7444,8 @@
         </p:blipFill>
         <p:spPr>
           <a:xfrm>
-            <a:off x="1004551" y="592429"/>
-            <a:ext cx="9569003" cy="3361386"/>
+            <a:off x="1043189" y="927279"/>
+            <a:ext cx="8590208" cy="3618963"/>
           </a:xfrm>
           <a:prstGeom prst="rect">
             <a:avLst/>

</xml_diff>